<commit_message>
final updates of microservices 102 (msg patterns)
</commit_message>
<xml_diff>
--- a/Presentatie/Microservices 102 20190802.pptx
+++ b/Presentatie/Microservices 102 20190802.pptx
@@ -5,10 +5,10 @@
     <p:sldMasterId id="2147483648" r:id="rId4"/>
   </p:sldMasterIdLst>
   <p:notesMasterIdLst>
-    <p:notesMasterId r:id="rId13"/>
+    <p:notesMasterId r:id="rId14"/>
   </p:notesMasterIdLst>
   <p:handoutMasterIdLst>
-    <p:handoutMasterId r:id="rId14"/>
+    <p:handoutMasterId r:id="rId15"/>
   </p:handoutMasterIdLst>
   <p:sldIdLst>
     <p:sldId id="257" r:id="rId5"/>
@@ -17,8 +17,9 @@
     <p:sldId id="267" r:id="rId8"/>
     <p:sldId id="268" r:id="rId9"/>
     <p:sldId id="269" r:id="rId10"/>
-    <p:sldId id="279" r:id="rId11"/>
-    <p:sldId id="277" r:id="rId12"/>
+    <p:sldId id="280" r:id="rId11"/>
+    <p:sldId id="279" r:id="rId12"/>
+    <p:sldId id="277" r:id="rId13"/>
   </p:sldIdLst>
   <p:sldSz cx="9144000" cy="6858000" type="screen4x3"/>
   <p:notesSz cx="6858000" cy="9144000"/>
@@ -1620,36 +1621,33 @@
           <a:lstStyle/>
           <a:p>
             <a:r>
-              <a:rPr lang="en-US" dirty="0" err="1"/>
-              <a:t>Gestippelde</a:t>
-            </a:r>
-            <a:r>
-              <a:rPr lang="en-US" dirty="0"/>
-              <a:t> </a:t>
-            </a:r>
-            <a:r>
-              <a:rPr lang="en-US" dirty="0" err="1"/>
-              <a:t>lijnen</a:t>
-            </a:r>
-            <a:r>
-              <a:rPr lang="en-US" dirty="0"/>
-              <a:t>: </a:t>
-            </a:r>
-            <a:r>
-              <a:rPr lang="en-US" dirty="0" err="1"/>
-              <a:t>dat</a:t>
-            </a:r>
-            <a:r>
-              <a:rPr lang="en-US" dirty="0"/>
-              <a:t> </a:t>
-            </a:r>
-            <a:r>
-              <a:rPr lang="en-US" dirty="0" err="1"/>
-              <a:t>zijn</a:t>
-            </a:r>
-            <a:r>
-              <a:rPr lang="en-US" dirty="0"/>
-              <a:t> containers</a:t>
+              <a:rPr lang="nl-NL" dirty="0"/>
+              <a:t>RPC mogelijk i.v.m. gebruik </a:t>
+            </a:r>
+            <a:r>
+              <a:rPr lang="nl-NL" dirty="0" err="1"/>
+              <a:t>EasyNetQ</a:t>
+            </a:r>
+            <a:endParaRPr lang="nl-NL" dirty="0"/>
+          </a:p>
+          <a:p>
+            <a:r>
+              <a:rPr lang="nl-NL" dirty="0"/>
+              <a:t>Pub-Sub o.b.v. event type of topic</a:t>
+            </a:r>
+          </a:p>
+          <a:p>
+            <a:r>
+              <a:rPr lang="nl-NL" dirty="0" err="1"/>
+              <a:t>Command</a:t>
+            </a:r>
+            <a:r>
+              <a:rPr lang="nl-NL" dirty="0"/>
+              <a:t> in feite </a:t>
+            </a:r>
+            <a:r>
+              <a:rPr lang="nl-NL" dirty="0" err="1"/>
+              <a:t>fire-and-forget</a:t>
             </a:r>
             <a:endParaRPr lang="nl-NL" dirty="0"/>
           </a:p>
@@ -1673,6 +1671,131 @@
             <a:fld id="{2DB1139D-5AC7-4B0B-A715-E40E0591EF82}" type="slidenum">
               <a:rPr lang="nl-NL" smtClean="0"/>
               <a:t>7</a:t>
+            </a:fld>
+            <a:endParaRPr lang="nl-NL"/>
+          </a:p>
+        </p:txBody>
+      </p:sp>
+    </p:spTree>
+    <p:extLst>
+      <p:ext uri="{BB962C8B-B14F-4D97-AF65-F5344CB8AC3E}">
+        <p14:creationId xmlns:p14="http://schemas.microsoft.com/office/powerpoint/2010/main" val="994489876"/>
+      </p:ext>
+    </p:extLst>
+  </p:cSld>
+  <p:clrMapOvr>
+    <a:masterClrMapping/>
+  </p:clrMapOvr>
+</p:notes>
+</file>
+
+<file path=ppt/notesSlides/notesSlide7.xml><?xml version="1.0" encoding="utf-8"?>
+<p:notes xmlns:a="http://schemas.openxmlformats.org/drawingml/2006/main" xmlns:r="http://schemas.openxmlformats.org/officeDocument/2006/relationships" xmlns:p="http://schemas.openxmlformats.org/presentationml/2006/main">
+  <p:cSld>
+    <p:spTree>
+      <p:nvGrpSpPr>
+        <p:cNvPr id="1" name=""/>
+        <p:cNvGrpSpPr/>
+        <p:nvPr/>
+      </p:nvGrpSpPr>
+      <p:grpSpPr>
+        <a:xfrm>
+          <a:off x="0" y="0"/>
+          <a:ext cx="0" cy="0"/>
+          <a:chOff x="0" y="0"/>
+          <a:chExt cx="0" cy="0"/>
+        </a:xfrm>
+      </p:grpSpPr>
+      <p:sp>
+        <p:nvSpPr>
+          <p:cNvPr id="2" name="Slide Image Placeholder 1"/>
+          <p:cNvSpPr>
+            <a:spLocks noGrp="1" noRot="1" noChangeAspect="1"/>
+          </p:cNvSpPr>
+          <p:nvPr>
+            <p:ph type="sldImg"/>
+          </p:nvPr>
+        </p:nvSpPr>
+        <p:spPr/>
+      </p:sp>
+      <p:sp>
+        <p:nvSpPr>
+          <p:cNvPr id="3" name="Notes Placeholder 2"/>
+          <p:cNvSpPr>
+            <a:spLocks noGrp="1"/>
+          </p:cNvSpPr>
+          <p:nvPr>
+            <p:ph type="body" idx="1"/>
+          </p:nvPr>
+        </p:nvSpPr>
+        <p:spPr/>
+        <p:txBody>
+          <a:bodyPr/>
+          <a:lstStyle/>
+          <a:p>
+            <a:r>
+              <a:rPr lang="en-US" dirty="0" err="1"/>
+              <a:t>Gestippelde</a:t>
+            </a:r>
+            <a:r>
+              <a:rPr lang="en-US" dirty="0"/>
+              <a:t> </a:t>
+            </a:r>
+            <a:r>
+              <a:rPr lang="en-US" dirty="0" err="1"/>
+              <a:t>lijnen</a:t>
+            </a:r>
+            <a:r>
+              <a:rPr lang="en-US" dirty="0"/>
+              <a:t>: </a:t>
+            </a:r>
+            <a:r>
+              <a:rPr lang="en-US" dirty="0" err="1"/>
+              <a:t>dat</a:t>
+            </a:r>
+            <a:r>
+              <a:rPr lang="en-US" dirty="0"/>
+              <a:t> </a:t>
+            </a:r>
+            <a:r>
+              <a:rPr lang="en-US" dirty="0" err="1"/>
+              <a:t>zijn</a:t>
+            </a:r>
+            <a:r>
+              <a:rPr lang="en-US" dirty="0"/>
+              <a:t> containers</a:t>
+            </a:r>
+          </a:p>
+          <a:p>
+            <a:endParaRPr lang="en-US" dirty="0"/>
+          </a:p>
+          <a:p>
+            <a:r>
+              <a:rPr lang="en-US" dirty="0"/>
+              <a:t>Message patterns: RPC / Pub-Sub / Command</a:t>
+            </a:r>
+            <a:endParaRPr lang="nl-NL" dirty="0"/>
+          </a:p>
+        </p:txBody>
+      </p:sp>
+      <p:sp>
+        <p:nvSpPr>
+          <p:cNvPr id="4" name="Slide Number Placeholder 3"/>
+          <p:cNvSpPr>
+            <a:spLocks noGrp="1"/>
+          </p:cNvSpPr>
+          <p:nvPr>
+            <p:ph type="sldNum" sz="quarter" idx="5"/>
+          </p:nvPr>
+        </p:nvSpPr>
+        <p:spPr/>
+        <p:txBody>
+          <a:bodyPr/>
+          <a:lstStyle/>
+          <a:p>
+            <a:fld id="{2DB1139D-5AC7-4B0B-A715-E40E0591EF82}" type="slidenum">
+              <a:rPr lang="nl-NL" smtClean="0"/>
+              <a:t>8</a:t>
             </a:fld>
             <a:endParaRPr lang="nl-NL"/>
           </a:p>
@@ -4974,6 +5097,17 @@
             <a:r>
               <a:rPr lang="en-US" dirty="0"/>
               <a:t>maintenance</a:t>
+            </a:r>
+          </a:p>
+          <a:p>
+            <a:pPr marL="263207">
+              <a:spcAft>
+                <a:spcPts val="600"/>
+              </a:spcAft>
+            </a:pPr>
+            <a:r>
+              <a:rPr lang="en-US" dirty="0"/>
+              <a:t>Messaging patterns</a:t>
             </a:r>
             <a:endParaRPr lang="nl-NL" dirty="0"/>
           </a:p>
@@ -9598,6 +9732,860 @@
       </p:grpSpPr>
       <p:sp>
         <p:nvSpPr>
+          <p:cNvPr id="2" name="Title 1">
+            <a:extLst>
+              <a:ext uri="{FF2B5EF4-FFF2-40B4-BE49-F238E27FC236}">
+                <a16:creationId xmlns:a16="http://schemas.microsoft.com/office/drawing/2014/main" id="{81AAB351-8F97-4CE2-894D-2A825DE86C09}"/>
+              </a:ext>
+            </a:extLst>
+          </p:cNvPr>
+          <p:cNvSpPr>
+            <a:spLocks noGrp="1"/>
+          </p:cNvSpPr>
+          <p:nvPr>
+            <p:ph type="title"/>
+          </p:nvPr>
+        </p:nvSpPr>
+        <p:spPr>
+          <a:xfrm>
+            <a:off x="617538" y="473075"/>
+            <a:ext cx="8163164" cy="613623"/>
+          </a:xfrm>
+        </p:spPr>
+        <p:txBody>
+          <a:bodyPr/>
+          <a:lstStyle/>
+          <a:p>
+            <a:r>
+              <a:rPr lang="en-US" dirty="0"/>
+              <a:t>Messaging patterns</a:t>
+            </a:r>
+            <a:endParaRPr lang="nl-NL" dirty="0"/>
+          </a:p>
+        </p:txBody>
+      </p:sp>
+      <p:sp>
+        <p:nvSpPr>
+          <p:cNvPr id="3" name="Content Placeholder 2">
+            <a:extLst>
+              <a:ext uri="{FF2B5EF4-FFF2-40B4-BE49-F238E27FC236}">
+                <a16:creationId xmlns:a16="http://schemas.microsoft.com/office/drawing/2014/main" id="{6595903C-65C1-4FA6-9DE9-7A54A04F0419}"/>
+              </a:ext>
+            </a:extLst>
+          </p:cNvPr>
+          <p:cNvSpPr>
+            <a:spLocks noGrp="1"/>
+          </p:cNvSpPr>
+          <p:nvPr>
+            <p:ph idx="1"/>
+          </p:nvPr>
+        </p:nvSpPr>
+        <p:spPr>
+          <a:xfrm>
+            <a:off x="617538" y="1163586"/>
+            <a:ext cx="8163164" cy="4866824"/>
+          </a:xfrm>
+        </p:spPr>
+        <p:txBody>
+          <a:bodyPr/>
+          <a:lstStyle/>
+          <a:p>
+            <a:r>
+              <a:rPr lang="nl-NL" dirty="0"/>
+              <a:t>RPC-</a:t>
+            </a:r>
+            <a:r>
+              <a:rPr lang="nl-NL" dirty="0" err="1"/>
+              <a:t>style</a:t>
+            </a:r>
+            <a:r>
+              <a:rPr lang="nl-NL" dirty="0"/>
+              <a:t> (Remote Procedure Call)</a:t>
+            </a:r>
+          </a:p>
+          <a:p>
+            <a:endParaRPr lang="nl-NL" dirty="0"/>
+          </a:p>
+          <a:p>
+            <a:endParaRPr lang="nl-NL" dirty="0"/>
+          </a:p>
+          <a:p>
+            <a:endParaRPr lang="nl-NL" dirty="0"/>
+          </a:p>
+          <a:p>
+            <a:pPr marL="0" indent="0">
+              <a:buNone/>
+            </a:pPr>
+            <a:endParaRPr lang="nl-NL" dirty="0"/>
+          </a:p>
+          <a:p>
+            <a:r>
+              <a:rPr lang="nl-NL" dirty="0"/>
+              <a:t>Pub/Sub (</a:t>
+            </a:r>
+            <a:r>
+              <a:rPr lang="nl-NL" dirty="0" err="1"/>
+              <a:t>Publish</a:t>
+            </a:r>
+            <a:r>
+              <a:rPr lang="nl-NL" dirty="0"/>
+              <a:t> </a:t>
+            </a:r>
+            <a:r>
+              <a:rPr lang="nl-NL" dirty="0" err="1"/>
+              <a:t>and</a:t>
+            </a:r>
+            <a:r>
+              <a:rPr lang="nl-NL" dirty="0"/>
+              <a:t> </a:t>
+            </a:r>
+            <a:r>
+              <a:rPr lang="nl-NL" dirty="0" err="1"/>
+              <a:t>Subscribe</a:t>
+            </a:r>
+            <a:r>
+              <a:rPr lang="nl-NL" dirty="0"/>
+              <a:t>)</a:t>
+            </a:r>
+          </a:p>
+          <a:p>
+            <a:endParaRPr lang="nl-NL" dirty="0"/>
+          </a:p>
+          <a:p>
+            <a:endParaRPr lang="nl-NL" dirty="0"/>
+          </a:p>
+          <a:p>
+            <a:endParaRPr lang="nl-NL" dirty="0"/>
+          </a:p>
+          <a:p>
+            <a:endParaRPr lang="nl-NL" dirty="0"/>
+          </a:p>
+          <a:p>
+            <a:r>
+              <a:rPr lang="nl-NL" dirty="0" err="1"/>
+              <a:t>Command</a:t>
+            </a:r>
+            <a:r>
+              <a:rPr lang="nl-NL" dirty="0"/>
+              <a:t> (</a:t>
+            </a:r>
+            <a:r>
+              <a:rPr lang="nl-NL" dirty="0" err="1"/>
+              <a:t>send</a:t>
+            </a:r>
+            <a:r>
+              <a:rPr lang="nl-NL" dirty="0"/>
+              <a:t>)</a:t>
+            </a:r>
+          </a:p>
+        </p:txBody>
+      </p:sp>
+      <p:sp>
+        <p:nvSpPr>
+          <p:cNvPr id="4" name="Date Placeholder 3">
+            <a:extLst>
+              <a:ext uri="{FF2B5EF4-FFF2-40B4-BE49-F238E27FC236}">
+                <a16:creationId xmlns:a16="http://schemas.microsoft.com/office/drawing/2014/main" id="{17E9A6B3-40BB-4882-A47E-B29FF7411CD4}"/>
+              </a:ext>
+            </a:extLst>
+          </p:cNvPr>
+          <p:cNvSpPr>
+            <a:spLocks noGrp="1"/>
+          </p:cNvSpPr>
+          <p:nvPr>
+            <p:ph type="dt" sz="half" idx="10"/>
+          </p:nvPr>
+        </p:nvSpPr>
+        <p:spPr/>
+        <p:txBody>
+          <a:bodyPr/>
+          <a:lstStyle/>
+          <a:p>
+            <a:fld id="{249B52C1-75DC-496B-AF3F-4978B95BB865}" type="datetime4">
+              <a:rPr lang="nl-NL" smtClean="0"/>
+              <a:pPr/>
+              <a:t>2 augustus 2019</a:t>
+            </a:fld>
+            <a:endParaRPr lang="nl-NL"/>
+          </a:p>
+        </p:txBody>
+      </p:sp>
+      <p:sp>
+        <p:nvSpPr>
+          <p:cNvPr id="5" name="Footer Placeholder 4">
+            <a:extLst>
+              <a:ext uri="{FF2B5EF4-FFF2-40B4-BE49-F238E27FC236}">
+                <a16:creationId xmlns:a16="http://schemas.microsoft.com/office/drawing/2014/main" id="{E488AF2B-F69C-474E-876A-104894F8744A}"/>
+              </a:ext>
+            </a:extLst>
+          </p:cNvPr>
+          <p:cNvSpPr>
+            <a:spLocks noGrp="1"/>
+          </p:cNvSpPr>
+          <p:nvPr>
+            <p:ph type="ftr" sz="quarter" idx="11"/>
+          </p:nvPr>
+        </p:nvSpPr>
+        <p:spPr/>
+        <p:txBody>
+          <a:bodyPr/>
+          <a:lstStyle/>
+          <a:p>
+            <a:r>
+              <a:rPr lang="nl-NL"/>
+              <a:t>Johannes Sim &amp; Renzo veldkamp</a:t>
+            </a:r>
+          </a:p>
+        </p:txBody>
+      </p:sp>
+      <p:cxnSp>
+        <p:nvCxnSpPr>
+          <p:cNvPr id="7" name="Straight Arrow Connector 6">
+            <a:extLst>
+              <a:ext uri="{FF2B5EF4-FFF2-40B4-BE49-F238E27FC236}">
+                <a16:creationId xmlns:a16="http://schemas.microsoft.com/office/drawing/2014/main" id="{FBB42F66-B838-4439-8442-75D0802AA647}"/>
+              </a:ext>
+            </a:extLst>
+          </p:cNvPr>
+          <p:cNvCxnSpPr/>
+          <p:nvPr/>
+        </p:nvCxnSpPr>
+        <p:spPr>
+          <a:xfrm>
+            <a:off x="2395959" y="1875099"/>
+            <a:ext cx="2419109" cy="0"/>
+          </a:xfrm>
+          <a:prstGeom prst="straightConnector1">
+            <a:avLst/>
+          </a:prstGeom>
+          <a:ln>
+            <a:tailEnd type="triangle"/>
+          </a:ln>
+        </p:spPr>
+        <p:style>
+          <a:lnRef idx="3">
+            <a:schemeClr val="accent2"/>
+          </a:lnRef>
+          <a:fillRef idx="0">
+            <a:schemeClr val="accent2"/>
+          </a:fillRef>
+          <a:effectRef idx="2">
+            <a:schemeClr val="accent2"/>
+          </a:effectRef>
+          <a:fontRef idx="minor">
+            <a:schemeClr val="tx1"/>
+          </a:fontRef>
+        </p:style>
+      </p:cxnSp>
+      <p:sp>
+        <p:nvSpPr>
+          <p:cNvPr id="8" name="TextBox 7">
+            <a:extLst>
+              <a:ext uri="{FF2B5EF4-FFF2-40B4-BE49-F238E27FC236}">
+                <a16:creationId xmlns:a16="http://schemas.microsoft.com/office/drawing/2014/main" id="{EFEFB964-0E0D-4962-87F7-7387048D896D}"/>
+              </a:ext>
+            </a:extLst>
+          </p:cNvPr>
+          <p:cNvSpPr txBox="1"/>
+          <p:nvPr/>
+        </p:nvSpPr>
+        <p:spPr>
+          <a:xfrm>
+            <a:off x="3155293" y="1468120"/>
+            <a:ext cx="900439" cy="369332"/>
+          </a:xfrm>
+          <a:prstGeom prst="rect">
+            <a:avLst/>
+          </a:prstGeom>
+          <a:noFill/>
+        </p:spPr>
+        <p:txBody>
+          <a:bodyPr wrap="none" rtlCol="0">
+            <a:spAutoFit/>
+          </a:bodyPr>
+          <a:lstStyle/>
+          <a:p>
+            <a:r>
+              <a:rPr lang="nl-NL" dirty="0" err="1"/>
+              <a:t>request</a:t>
+            </a:r>
+            <a:endParaRPr lang="nl-NL" dirty="0"/>
+          </a:p>
+        </p:txBody>
+      </p:sp>
+      <p:cxnSp>
+        <p:nvCxnSpPr>
+          <p:cNvPr id="9" name="Straight Arrow Connector 8">
+            <a:extLst>
+              <a:ext uri="{FF2B5EF4-FFF2-40B4-BE49-F238E27FC236}">
+                <a16:creationId xmlns:a16="http://schemas.microsoft.com/office/drawing/2014/main" id="{B8D3CA9A-520E-4A45-ADC2-3B4DB8CC4CA4}"/>
+              </a:ext>
+            </a:extLst>
+          </p:cNvPr>
+          <p:cNvCxnSpPr>
+            <a:cxnSpLocks/>
+          </p:cNvCxnSpPr>
+          <p:nvPr/>
+        </p:nvCxnSpPr>
+        <p:spPr>
+          <a:xfrm flipH="1">
+            <a:off x="2395960" y="2358967"/>
+            <a:ext cx="2358920" cy="0"/>
+          </a:xfrm>
+          <a:prstGeom prst="straightConnector1">
+            <a:avLst/>
+          </a:prstGeom>
+          <a:ln>
+            <a:tailEnd type="triangle"/>
+          </a:ln>
+        </p:spPr>
+        <p:style>
+          <a:lnRef idx="3">
+            <a:schemeClr val="accent2"/>
+          </a:lnRef>
+          <a:fillRef idx="0">
+            <a:schemeClr val="accent2"/>
+          </a:fillRef>
+          <a:effectRef idx="2">
+            <a:schemeClr val="accent2"/>
+          </a:effectRef>
+          <a:fontRef idx="minor">
+            <a:schemeClr val="tx1"/>
+          </a:fontRef>
+        </p:style>
+      </p:cxnSp>
+      <p:sp>
+        <p:nvSpPr>
+          <p:cNvPr id="10" name="TextBox 9">
+            <a:extLst>
+              <a:ext uri="{FF2B5EF4-FFF2-40B4-BE49-F238E27FC236}">
+                <a16:creationId xmlns:a16="http://schemas.microsoft.com/office/drawing/2014/main" id="{15029A7F-4C50-424E-83C9-4B7B13C29509}"/>
+              </a:ext>
+            </a:extLst>
+          </p:cNvPr>
+          <p:cNvSpPr txBox="1"/>
+          <p:nvPr/>
+        </p:nvSpPr>
+        <p:spPr>
+          <a:xfrm>
+            <a:off x="3155292" y="2358967"/>
+            <a:ext cx="1037656" cy="369332"/>
+          </a:xfrm>
+          <a:prstGeom prst="rect">
+            <a:avLst/>
+          </a:prstGeom>
+          <a:noFill/>
+        </p:spPr>
+        <p:txBody>
+          <a:bodyPr wrap="none" rtlCol="0">
+            <a:spAutoFit/>
+          </a:bodyPr>
+          <a:lstStyle/>
+          <a:p>
+            <a:r>
+              <a:rPr lang="nl-NL" dirty="0"/>
+              <a:t>response</a:t>
+            </a:r>
+          </a:p>
+        </p:txBody>
+      </p:sp>
+      <p:sp>
+        <p:nvSpPr>
+          <p:cNvPr id="14" name="TextBox 13">
+            <a:extLst>
+              <a:ext uri="{FF2B5EF4-FFF2-40B4-BE49-F238E27FC236}">
+                <a16:creationId xmlns:a16="http://schemas.microsoft.com/office/drawing/2014/main" id="{A6E42752-BA15-477A-A8A0-9B99225A178A}"/>
+              </a:ext>
+            </a:extLst>
+          </p:cNvPr>
+          <p:cNvSpPr txBox="1"/>
+          <p:nvPr/>
+        </p:nvSpPr>
+        <p:spPr>
+          <a:xfrm>
+            <a:off x="1071880" y="1620303"/>
+            <a:ext cx="1185581" cy="923330"/>
+          </a:xfrm>
+          <a:prstGeom prst="rect">
+            <a:avLst/>
+          </a:prstGeom>
+          <a:noFill/>
+        </p:spPr>
+        <p:txBody>
+          <a:bodyPr wrap="none" rtlCol="0">
+            <a:spAutoFit/>
+          </a:bodyPr>
+          <a:lstStyle/>
+          <a:p>
+            <a:r>
+              <a:rPr lang="nl-NL" dirty="0" err="1"/>
+              <a:t>send</a:t>
+            </a:r>
+            <a:endParaRPr lang="nl-NL" dirty="0"/>
+          </a:p>
+          <a:p>
+            <a:r>
+              <a:rPr lang="nl-NL" dirty="0"/>
+              <a:t>,</a:t>
+            </a:r>
+          </a:p>
+          <a:p>
+            <a:r>
+              <a:rPr lang="nl-NL" dirty="0" err="1"/>
+              <a:t>then</a:t>
+            </a:r>
+            <a:r>
+              <a:rPr lang="nl-NL" dirty="0"/>
+              <a:t> </a:t>
+            </a:r>
+            <a:r>
+              <a:rPr lang="nl-NL" dirty="0" err="1"/>
+              <a:t>await</a:t>
+            </a:r>
+            <a:endParaRPr lang="nl-NL" dirty="0"/>
+          </a:p>
+        </p:txBody>
+      </p:sp>
+      <p:cxnSp>
+        <p:nvCxnSpPr>
+          <p:cNvPr id="15" name="Straight Arrow Connector 14">
+            <a:extLst>
+              <a:ext uri="{FF2B5EF4-FFF2-40B4-BE49-F238E27FC236}">
+                <a16:creationId xmlns:a16="http://schemas.microsoft.com/office/drawing/2014/main" id="{212CB58A-76F7-4C7C-96B4-12756C81BB5D}"/>
+              </a:ext>
+            </a:extLst>
+          </p:cNvPr>
+          <p:cNvCxnSpPr/>
+          <p:nvPr/>
+        </p:nvCxnSpPr>
+        <p:spPr>
+          <a:xfrm>
+            <a:off x="2395959" y="3691996"/>
+            <a:ext cx="2419109" cy="0"/>
+          </a:xfrm>
+          <a:prstGeom prst="straightConnector1">
+            <a:avLst/>
+          </a:prstGeom>
+          <a:ln>
+            <a:tailEnd type="triangle"/>
+          </a:ln>
+        </p:spPr>
+        <p:style>
+          <a:lnRef idx="3">
+            <a:schemeClr val="accent2"/>
+          </a:lnRef>
+          <a:fillRef idx="0">
+            <a:schemeClr val="accent2"/>
+          </a:fillRef>
+          <a:effectRef idx="2">
+            <a:schemeClr val="accent2"/>
+          </a:effectRef>
+          <a:fontRef idx="minor">
+            <a:schemeClr val="tx1"/>
+          </a:fontRef>
+        </p:style>
+      </p:cxnSp>
+      <p:sp>
+        <p:nvSpPr>
+          <p:cNvPr id="16" name="TextBox 15">
+            <a:extLst>
+              <a:ext uri="{FF2B5EF4-FFF2-40B4-BE49-F238E27FC236}">
+                <a16:creationId xmlns:a16="http://schemas.microsoft.com/office/drawing/2014/main" id="{D54D5527-D540-4952-800B-31D109690653}"/>
+              </a:ext>
+            </a:extLst>
+          </p:cNvPr>
+          <p:cNvSpPr txBox="1"/>
+          <p:nvPr/>
+        </p:nvSpPr>
+        <p:spPr>
+          <a:xfrm>
+            <a:off x="3155293" y="3285017"/>
+            <a:ext cx="2211503" cy="369332"/>
+          </a:xfrm>
+          <a:prstGeom prst="rect">
+            <a:avLst/>
+          </a:prstGeom>
+          <a:noFill/>
+        </p:spPr>
+        <p:txBody>
+          <a:bodyPr wrap="none" rtlCol="0">
+            <a:spAutoFit/>
+          </a:bodyPr>
+          <a:lstStyle/>
+          <a:p>
+            <a:r>
+              <a:rPr lang="nl-NL" dirty="0"/>
+              <a:t>event (evt. met topic)</a:t>
+            </a:r>
+          </a:p>
+        </p:txBody>
+      </p:sp>
+      <p:cxnSp>
+        <p:nvCxnSpPr>
+          <p:cNvPr id="17" name="Straight Arrow Connector 16">
+            <a:extLst>
+              <a:ext uri="{FF2B5EF4-FFF2-40B4-BE49-F238E27FC236}">
+                <a16:creationId xmlns:a16="http://schemas.microsoft.com/office/drawing/2014/main" id="{FFEB6834-FB7C-4F60-92B1-24A08111B949}"/>
+              </a:ext>
+            </a:extLst>
+          </p:cNvPr>
+          <p:cNvCxnSpPr>
+            <a:cxnSpLocks/>
+          </p:cNvCxnSpPr>
+          <p:nvPr/>
+        </p:nvCxnSpPr>
+        <p:spPr>
+          <a:xfrm flipH="1">
+            <a:off x="2395960" y="4175864"/>
+            <a:ext cx="2358920" cy="0"/>
+          </a:xfrm>
+          <a:prstGeom prst="straightConnector1">
+            <a:avLst/>
+          </a:prstGeom>
+          <a:ln>
+            <a:tailEnd type="triangle"/>
+          </a:ln>
+        </p:spPr>
+        <p:style>
+          <a:lnRef idx="3">
+            <a:schemeClr val="accent2"/>
+          </a:lnRef>
+          <a:fillRef idx="0">
+            <a:schemeClr val="accent2"/>
+          </a:fillRef>
+          <a:effectRef idx="2">
+            <a:schemeClr val="accent2"/>
+          </a:effectRef>
+          <a:fontRef idx="minor">
+            <a:schemeClr val="tx1"/>
+          </a:fontRef>
+        </p:style>
+      </p:cxnSp>
+      <p:sp>
+        <p:nvSpPr>
+          <p:cNvPr id="18" name="TextBox 17">
+            <a:extLst>
+              <a:ext uri="{FF2B5EF4-FFF2-40B4-BE49-F238E27FC236}">
+                <a16:creationId xmlns:a16="http://schemas.microsoft.com/office/drawing/2014/main" id="{DCCF5C55-C9B1-41C7-91E3-82C53A15C181}"/>
+              </a:ext>
+            </a:extLst>
+          </p:cNvPr>
+          <p:cNvSpPr txBox="1"/>
+          <p:nvPr/>
+        </p:nvSpPr>
+        <p:spPr>
+          <a:xfrm>
+            <a:off x="3155292" y="4175864"/>
+            <a:ext cx="2211503" cy="369332"/>
+          </a:xfrm>
+          <a:prstGeom prst="rect">
+            <a:avLst/>
+          </a:prstGeom>
+          <a:noFill/>
+        </p:spPr>
+        <p:txBody>
+          <a:bodyPr wrap="none" rtlCol="0">
+            <a:spAutoFit/>
+          </a:bodyPr>
+          <a:lstStyle/>
+          <a:p>
+            <a:r>
+              <a:rPr lang="nl-NL" dirty="0"/>
+              <a:t>event (evt. met topic)</a:t>
+            </a:r>
+          </a:p>
+        </p:txBody>
+      </p:sp>
+      <p:sp>
+        <p:nvSpPr>
+          <p:cNvPr id="19" name="TextBox 18">
+            <a:extLst>
+              <a:ext uri="{FF2B5EF4-FFF2-40B4-BE49-F238E27FC236}">
+                <a16:creationId xmlns:a16="http://schemas.microsoft.com/office/drawing/2014/main" id="{AA9EF68F-135D-4157-B3CF-46E2E2E7238F}"/>
+              </a:ext>
+            </a:extLst>
+          </p:cNvPr>
+          <p:cNvSpPr txBox="1"/>
+          <p:nvPr/>
+        </p:nvSpPr>
+        <p:spPr>
+          <a:xfrm>
+            <a:off x="1071880" y="3437200"/>
+            <a:ext cx="1324209" cy="923330"/>
+          </a:xfrm>
+          <a:prstGeom prst="rect">
+            <a:avLst/>
+          </a:prstGeom>
+          <a:noFill/>
+        </p:spPr>
+        <p:txBody>
+          <a:bodyPr wrap="none" rtlCol="0">
+            <a:spAutoFit/>
+          </a:bodyPr>
+          <a:lstStyle/>
+          <a:p>
+            <a:r>
+              <a:rPr lang="nl-NL" dirty="0" err="1"/>
+              <a:t>send</a:t>
+            </a:r>
+            <a:endParaRPr lang="nl-NL" dirty="0"/>
+          </a:p>
+          <a:p>
+            <a:r>
+              <a:rPr lang="nl-NL" dirty="0"/>
+              <a:t>OF</a:t>
+            </a:r>
+          </a:p>
+          <a:p>
+            <a:r>
+              <a:rPr lang="nl-NL" dirty="0" err="1"/>
+              <a:t>subscribe</a:t>
+            </a:r>
+            <a:r>
+              <a:rPr lang="nl-NL" dirty="0"/>
+              <a:t> </a:t>
+            </a:r>
+            <a:r>
+              <a:rPr lang="nl-NL" dirty="0" err="1"/>
+              <a:t>to</a:t>
+            </a:r>
+            <a:endParaRPr lang="nl-NL" dirty="0"/>
+          </a:p>
+        </p:txBody>
+      </p:sp>
+      <p:cxnSp>
+        <p:nvCxnSpPr>
+          <p:cNvPr id="20" name="Straight Arrow Connector 19">
+            <a:extLst>
+              <a:ext uri="{FF2B5EF4-FFF2-40B4-BE49-F238E27FC236}">
+                <a16:creationId xmlns:a16="http://schemas.microsoft.com/office/drawing/2014/main" id="{1C331782-E25D-478F-B3B5-F6F83568BDE6}"/>
+              </a:ext>
+            </a:extLst>
+          </p:cNvPr>
+          <p:cNvCxnSpPr/>
+          <p:nvPr/>
+        </p:nvCxnSpPr>
+        <p:spPr>
+          <a:xfrm>
+            <a:off x="2395829" y="5256709"/>
+            <a:ext cx="2419109" cy="0"/>
+          </a:xfrm>
+          <a:prstGeom prst="straightConnector1">
+            <a:avLst/>
+          </a:prstGeom>
+          <a:ln>
+            <a:tailEnd type="triangle"/>
+          </a:ln>
+        </p:spPr>
+        <p:style>
+          <a:lnRef idx="3">
+            <a:schemeClr val="accent2"/>
+          </a:lnRef>
+          <a:fillRef idx="0">
+            <a:schemeClr val="accent2"/>
+          </a:fillRef>
+          <a:effectRef idx="2">
+            <a:schemeClr val="accent2"/>
+          </a:effectRef>
+          <a:fontRef idx="minor">
+            <a:schemeClr val="tx1"/>
+          </a:fontRef>
+        </p:style>
+      </p:cxnSp>
+      <p:sp>
+        <p:nvSpPr>
+          <p:cNvPr id="21" name="TextBox 20">
+            <a:extLst>
+              <a:ext uri="{FF2B5EF4-FFF2-40B4-BE49-F238E27FC236}">
+                <a16:creationId xmlns:a16="http://schemas.microsoft.com/office/drawing/2014/main" id="{B0DB00EB-E528-4006-9302-94861FD967F5}"/>
+              </a:ext>
+            </a:extLst>
+          </p:cNvPr>
+          <p:cNvSpPr txBox="1"/>
+          <p:nvPr/>
+        </p:nvSpPr>
+        <p:spPr>
+          <a:xfrm>
+            <a:off x="3155163" y="4849730"/>
+            <a:ext cx="1125308" cy="369332"/>
+          </a:xfrm>
+          <a:prstGeom prst="rect">
+            <a:avLst/>
+          </a:prstGeom>
+          <a:noFill/>
+        </p:spPr>
+        <p:txBody>
+          <a:bodyPr wrap="none" rtlCol="0">
+            <a:spAutoFit/>
+          </a:bodyPr>
+          <a:lstStyle/>
+          <a:p>
+            <a:r>
+              <a:rPr lang="nl-NL" dirty="0" err="1"/>
+              <a:t>command</a:t>
+            </a:r>
+            <a:endParaRPr lang="nl-NL" dirty="0"/>
+          </a:p>
+        </p:txBody>
+      </p:sp>
+      <p:sp>
+        <p:nvSpPr>
+          <p:cNvPr id="22" name="TextBox 21">
+            <a:extLst>
+              <a:ext uri="{FF2B5EF4-FFF2-40B4-BE49-F238E27FC236}">
+                <a16:creationId xmlns:a16="http://schemas.microsoft.com/office/drawing/2014/main" id="{77A6133B-ABA5-438A-ADD8-52D9893EF203}"/>
+              </a:ext>
+            </a:extLst>
+          </p:cNvPr>
+          <p:cNvSpPr txBox="1"/>
+          <p:nvPr/>
+        </p:nvSpPr>
+        <p:spPr>
+          <a:xfrm>
+            <a:off x="1071750" y="5001913"/>
+            <a:ext cx="860685" cy="923330"/>
+          </a:xfrm>
+          <a:prstGeom prst="rect">
+            <a:avLst/>
+          </a:prstGeom>
+          <a:noFill/>
+        </p:spPr>
+        <p:txBody>
+          <a:bodyPr wrap="none" rtlCol="0">
+            <a:spAutoFit/>
+          </a:bodyPr>
+          <a:lstStyle/>
+          <a:p>
+            <a:r>
+              <a:rPr lang="nl-NL" dirty="0" err="1"/>
+              <a:t>send</a:t>
+            </a:r>
+            <a:endParaRPr lang="nl-NL" dirty="0"/>
+          </a:p>
+          <a:p>
+            <a:r>
+              <a:rPr lang="nl-NL" dirty="0"/>
+              <a:t>OF</a:t>
+            </a:r>
+          </a:p>
+          <a:p>
+            <a:r>
+              <a:rPr lang="nl-NL" dirty="0" err="1"/>
+              <a:t>receive</a:t>
+            </a:r>
+            <a:endParaRPr lang="nl-NL" dirty="0"/>
+          </a:p>
+        </p:txBody>
+      </p:sp>
+      <p:cxnSp>
+        <p:nvCxnSpPr>
+          <p:cNvPr id="23" name="Straight Arrow Connector 22">
+            <a:extLst>
+              <a:ext uri="{FF2B5EF4-FFF2-40B4-BE49-F238E27FC236}">
+                <a16:creationId xmlns:a16="http://schemas.microsoft.com/office/drawing/2014/main" id="{75E101BD-454C-4596-8196-7F262B4F783C}"/>
+              </a:ext>
+            </a:extLst>
+          </p:cNvPr>
+          <p:cNvCxnSpPr>
+            <a:cxnSpLocks/>
+          </p:cNvCxnSpPr>
+          <p:nvPr/>
+        </p:nvCxnSpPr>
+        <p:spPr>
+          <a:xfrm flipH="1">
+            <a:off x="2395829" y="5785498"/>
+            <a:ext cx="2419109" cy="0"/>
+          </a:xfrm>
+          <a:prstGeom prst="straightConnector1">
+            <a:avLst/>
+          </a:prstGeom>
+          <a:ln>
+            <a:tailEnd type="triangle"/>
+          </a:ln>
+        </p:spPr>
+        <p:style>
+          <a:lnRef idx="3">
+            <a:schemeClr val="accent2"/>
+          </a:lnRef>
+          <a:fillRef idx="0">
+            <a:schemeClr val="accent2"/>
+          </a:fillRef>
+          <a:effectRef idx="2">
+            <a:schemeClr val="accent2"/>
+          </a:effectRef>
+          <a:fontRef idx="minor">
+            <a:schemeClr val="tx1"/>
+          </a:fontRef>
+        </p:style>
+      </p:cxnSp>
+      <p:sp>
+        <p:nvSpPr>
+          <p:cNvPr id="24" name="TextBox 23">
+            <a:extLst>
+              <a:ext uri="{FF2B5EF4-FFF2-40B4-BE49-F238E27FC236}">
+                <a16:creationId xmlns:a16="http://schemas.microsoft.com/office/drawing/2014/main" id="{78ABECF5-7EC3-41C2-8AC2-602AB7C2D940}"/>
+              </a:ext>
+            </a:extLst>
+          </p:cNvPr>
+          <p:cNvSpPr txBox="1"/>
+          <p:nvPr/>
+        </p:nvSpPr>
+        <p:spPr>
+          <a:xfrm>
+            <a:off x="3145981" y="5416166"/>
+            <a:ext cx="1125308" cy="369332"/>
+          </a:xfrm>
+          <a:prstGeom prst="rect">
+            <a:avLst/>
+          </a:prstGeom>
+          <a:noFill/>
+        </p:spPr>
+        <p:txBody>
+          <a:bodyPr wrap="none" rtlCol="0">
+            <a:spAutoFit/>
+          </a:bodyPr>
+          <a:lstStyle/>
+          <a:p>
+            <a:r>
+              <a:rPr lang="nl-NL" dirty="0" err="1"/>
+              <a:t>command</a:t>
+            </a:r>
+            <a:endParaRPr lang="nl-NL" dirty="0"/>
+          </a:p>
+        </p:txBody>
+      </p:sp>
+    </p:spTree>
+    <p:extLst>
+      <p:ext uri="{BB962C8B-B14F-4D97-AF65-F5344CB8AC3E}">
+        <p14:creationId xmlns:p14="http://schemas.microsoft.com/office/powerpoint/2010/main" val="3804920768"/>
+      </p:ext>
+    </p:extLst>
+  </p:cSld>
+  <p:clrMapOvr>
+    <a:masterClrMapping/>
+  </p:clrMapOvr>
+</p:sld>
+</file>
+
+<file path=ppt/slides/slide8.xml><?xml version="1.0" encoding="utf-8"?>
+<p:sld xmlns:a="http://schemas.openxmlformats.org/drawingml/2006/main" xmlns:r="http://schemas.openxmlformats.org/officeDocument/2006/relationships" xmlns:p="http://schemas.openxmlformats.org/presentationml/2006/main">
+  <p:cSld>
+    <p:spTree>
+      <p:nvGrpSpPr>
+        <p:cNvPr id="1" name=""/>
+        <p:cNvGrpSpPr/>
+        <p:nvPr/>
+      </p:nvGrpSpPr>
+      <p:grpSpPr>
+        <a:xfrm>
+          <a:off x="0" y="0"/>
+          <a:ext cx="0" cy="0"/>
+          <a:chOff x="0" y="0"/>
+          <a:chExt cx="0" cy="0"/>
+        </a:xfrm>
+      </p:grpSpPr>
+      <p:sp>
+        <p:nvSpPr>
           <p:cNvPr id="2" name="Title 1"/>
           <p:cNvSpPr>
             <a:spLocks noGrp="1"/>
@@ -10524,7 +11512,7 @@
 </p:sld>
 </file>
 
-<file path=ppt/slides/slide8.xml><?xml version="1.0" encoding="utf-8"?>
+<file path=ppt/slides/slide9.xml><?xml version="1.0" encoding="utf-8"?>
 <p:sld xmlns:a="http://schemas.openxmlformats.org/drawingml/2006/main" xmlns:r="http://schemas.openxmlformats.org/officeDocument/2006/relationships" xmlns:p="http://schemas.openxmlformats.org/presentationml/2006/main">
   <p:cSld>
     <p:spTree>
@@ -11607,6 +12595,21 @@
 </file>
 
 <file path=customXml/item1.xml><?xml version="1.0" encoding="utf-8"?>
+<?mso-contentType ?>
+<FormTemplates xmlns="http://schemas.microsoft.com/sharepoint/v3/contenttype/forms">
+  <Display>DocumentLibraryForm</Display>
+  <Edit>DocumentLibraryForm</Edit>
+  <New>DocumentLibraryForm</New>
+</FormTemplates>
+</file>
+
+<file path=customXml/item2.xml><?xml version="1.0" encoding="utf-8"?>
+<p:properties xmlns:p="http://schemas.microsoft.com/office/2006/metadata/properties" xmlns:xsi="http://www.w3.org/2001/XMLSchema-instance" xmlns:pc="http://schemas.microsoft.com/office/infopath/2007/PartnerControls">
+  <documentManagement/>
+</p:properties>
+</file>
+
+<file path=customXml/item3.xml><?xml version="1.0" encoding="utf-8"?>
 <ct:contentTypeSchema xmlns:ct="http://schemas.microsoft.com/office/2006/metadata/contentType" xmlns:ma="http://schemas.microsoft.com/office/2006/metadata/properties/metaAttributes" ct:_="" ma:_="" ma:contentTypeName="Document" ma:contentTypeID="0x0101009843F10021B1B74BA5DD583B6999787F" ma:contentTypeVersion="1" ma:contentTypeDescription="Een nieuw document maken." ma:contentTypeScope="" ma:versionID="9f7dad7ca3b37095ed9229a6a072267d">
   <xsd:schema xmlns:xsd="http://www.w3.org/2001/XMLSchema" xmlns:xs="http://www.w3.org/2001/XMLSchema" xmlns:p="http://schemas.microsoft.com/office/2006/metadata/properties" targetNamespace="http://schemas.microsoft.com/office/2006/metadata/properties" ma:root="true" ma:fieldsID="a17e5968c79d9fe2fc9f8835eee23f58">
     <xsd:element name="properties">
@@ -11720,33 +12723,10 @@
 </ct:contentTypeSchema>
 </file>
 
-<file path=customXml/item2.xml><?xml version="1.0" encoding="utf-8"?>
-<p:properties xmlns:p="http://schemas.microsoft.com/office/2006/metadata/properties" xmlns:xsi="http://www.w3.org/2001/XMLSchema-instance" xmlns:pc="http://schemas.microsoft.com/office/infopath/2007/PartnerControls">
-  <documentManagement/>
-</p:properties>
-</file>
-
-<file path=customXml/item3.xml><?xml version="1.0" encoding="utf-8"?>
-<?mso-contentType ?>
-<FormTemplates xmlns="http://schemas.microsoft.com/sharepoint/v3/contenttype/forms">
-  <Display>DocumentLibraryForm</Display>
-  <Edit>DocumentLibraryForm</Edit>
-  <New>DocumentLibraryForm</New>
-</FormTemplates>
-</file>
-
 <file path=customXml/itemProps1.xml><?xml version="1.0" encoding="utf-8"?>
-<ds:datastoreItem xmlns:ds="http://schemas.openxmlformats.org/officeDocument/2006/customXml" ds:itemID="{3175F035-B069-4F0E-ADC8-454931FDE34D}">
+<ds:datastoreItem xmlns:ds="http://schemas.openxmlformats.org/officeDocument/2006/customXml" ds:itemID="{4A752D92-0ACC-48D2-A658-AB744FE70ECE}">
   <ds:schemaRefs>
-    <ds:schemaRef ds:uri="http://purl.org/dc/elements/1.1/"/>
-    <ds:schemaRef ds:uri="http://purl.org/dc/terms/"/>
-    <ds:schemaRef ds:uri="http://schemas.microsoft.com/internal/obd"/>
-    <ds:schemaRef ds:uri="http://schemas.microsoft.com/office/2006/metadata/contentType"/>
-    <ds:schemaRef ds:uri="http://schemas.microsoft.com/office/2006/metadata/properties"/>
-    <ds:schemaRef ds:uri="http://schemas.microsoft.com/office/2006/metadata/properties/metaAttributes"/>
-    <ds:schemaRef ds:uri="http://schemas.microsoft.com/office/infopath/2007/PartnerControls"/>
-    <ds:schemaRef ds:uri="http://schemas.openxmlformats.org/package/2006/metadata/core-properties"/>
-    <ds:schemaRef ds:uri="http://www.w3.org/2001/XMLSchema"/>
+    <ds:schemaRef ds:uri="http://schemas.microsoft.com/sharepoint/v3/contenttype/forms"/>
   </ds:schemaRefs>
 </ds:datastoreItem>
 </file>
@@ -11767,9 +12747,17 @@
 </file>
 
 <file path=customXml/itemProps3.xml><?xml version="1.0" encoding="utf-8"?>
-<ds:datastoreItem xmlns:ds="http://schemas.openxmlformats.org/officeDocument/2006/customXml" ds:itemID="{4A752D92-0ACC-48D2-A658-AB744FE70ECE}">
+<ds:datastoreItem xmlns:ds="http://schemas.openxmlformats.org/officeDocument/2006/customXml" ds:itemID="{3175F035-B069-4F0E-ADC8-454931FDE34D}">
   <ds:schemaRefs>
-    <ds:schemaRef ds:uri="http://schemas.microsoft.com/sharepoint/v3/contenttype/forms"/>
+    <ds:schemaRef ds:uri="http://purl.org/dc/elements/1.1/"/>
+    <ds:schemaRef ds:uri="http://purl.org/dc/terms/"/>
+    <ds:schemaRef ds:uri="http://schemas.microsoft.com/internal/obd"/>
+    <ds:schemaRef ds:uri="http://schemas.microsoft.com/office/2006/metadata/contentType"/>
+    <ds:schemaRef ds:uri="http://schemas.microsoft.com/office/2006/metadata/properties"/>
+    <ds:schemaRef ds:uri="http://schemas.microsoft.com/office/2006/metadata/properties/metaAttributes"/>
+    <ds:schemaRef ds:uri="http://schemas.microsoft.com/office/infopath/2007/PartnerControls"/>
+    <ds:schemaRef ds:uri="http://schemas.openxmlformats.org/package/2006/metadata/core-properties"/>
+    <ds:schemaRef ds:uri="http://www.w3.org/2001/XMLSchema"/>
   </ds:schemaRefs>
 </ds:datastoreItem>
 </file>
</xml_diff>